<commit_message>
small updates from gorry
</commit_message>
<xml_diff>
--- a/eucnc-june17/eucnc17-poster.pptx
+++ b/eucnc-june17/eucnc17-poster.pptx
@@ -2216,26 +2216,50 @@
                 </a:solidFill>
                 <a:latin typeface="Helvetica Neue"/>
               </a:rPr>
-              <a:t>often based on </a:t>
-            </a:r>
-            <a:r>
-              <a:rPr lang="en-US" sz="3200" b="1" dirty="0" smtClean="0">
-                <a:solidFill>
-                  <a:schemeClr val="tx1"/>
-                </a:solidFill>
-                <a:latin typeface="Helvetica Neue"/>
-              </a:rPr>
-              <a:t>clear text information</a:t>
-            </a:r>
-            <a:r>
-              <a:rPr lang="en-US" sz="3200" dirty="0" smtClean="0">
-                <a:solidFill>
-                  <a:schemeClr val="tx1"/>
-                </a:solidFill>
-                <a:latin typeface="Helvetica Neue"/>
-              </a:rPr>
-              <a:t> in protocol headers/payload </a:t>
-            </a:r>
+              <a:t>often </a:t>
+            </a:r>
+            <a:r>
+              <a:rPr lang="en-US" sz="3200" dirty="0" err="1">
+                <a:solidFill>
+                  <a:schemeClr val="tx1"/>
+                </a:solidFill>
+                <a:latin typeface="Helvetica Neue"/>
+              </a:rPr>
+              <a:t>utilising</a:t>
+            </a:r>
+            <a:r>
+              <a:rPr lang="en-US" sz="3200" dirty="0">
+                <a:solidFill>
+                  <a:schemeClr val="tx1"/>
+                </a:solidFill>
+                <a:latin typeface="Helvetica Neue"/>
+              </a:rPr>
+              <a:t> </a:t>
+            </a:r>
+            <a:r>
+              <a:rPr lang="en-US" sz="3200" b="1" dirty="0">
+                <a:solidFill>
+                  <a:schemeClr val="tx1"/>
+                </a:solidFill>
+                <a:latin typeface="Helvetica Neue"/>
+              </a:rPr>
+              <a:t>clear text information </a:t>
+            </a:r>
+            <a:r>
+              <a:rPr lang="en-US" sz="3200" dirty="0">
+                <a:solidFill>
+                  <a:schemeClr val="tx1"/>
+                </a:solidFill>
+                <a:latin typeface="Helvetica Neue"/>
+              </a:rPr>
+              <a:t>in protocol headers/payload</a:t>
+            </a:r>
+            <a:endParaRPr lang="en-US" sz="3200" dirty="0" smtClean="0">
+              <a:solidFill>
+                <a:schemeClr val="tx1"/>
+              </a:solidFill>
+              <a:latin typeface="Helvetica Neue"/>
+            </a:endParaRPr>
           </a:p>
           <a:p>
             <a:pPr marL="457200" indent="-457200">
@@ -2358,32 +2382,20 @@
           </a:p>
           <a:p>
             <a:r>
-              <a:rPr lang="en-US" sz="3200" dirty="0" smtClean="0">
-                <a:solidFill>
-                  <a:schemeClr val="tx1"/>
-                </a:solidFill>
-                <a:latin typeface="Helvetica Neue"/>
-              </a:rPr>
-              <a:t>Three driving forces that presents a </a:t>
-            </a:r>
-            <a:r>
               <a:rPr lang="en-US" sz="3200" dirty="0">
                 <a:solidFill>
                   <a:schemeClr val="tx1"/>
                 </a:solidFill>
                 <a:latin typeface="Helvetica Neue"/>
               </a:rPr>
-              <a:t>need for architectural </a:t>
-            </a:r>
-            <a:r>
-              <a:rPr lang="en-US" sz="3200" dirty="0" smtClean="0">
-                <a:solidFill>
-                  <a:schemeClr val="tx1"/>
-                </a:solidFill>
-                <a:latin typeface="Helvetica Neue"/>
-              </a:rPr>
-              <a:t>changes:</a:t>
-            </a:r>
+              <a:t>Three driving forces presents a need for an architectural change:</a:t>
+            </a:r>
+            <a:endParaRPr lang="en-US" sz="3200" dirty="0" smtClean="0">
+              <a:solidFill>
+                <a:schemeClr val="tx1"/>
+              </a:solidFill>
+              <a:latin typeface="Helvetica Neue"/>
+            </a:endParaRPr>
           </a:p>
           <a:p>
             <a:endParaRPr lang="de-DE" sz="3200" dirty="0">
@@ -2472,22 +2484,13 @@
               </a:spcBef>
             </a:pPr>
             <a:r>
-              <a:rPr lang="en-US" sz="3200" dirty="0">
-                <a:solidFill>
-                  <a:schemeClr val="tx1"/>
-                </a:solidFill>
-                <a:latin typeface="Helvetica Neue"/>
-              </a:rPr>
-              <a:t>This raises </a:t>
-            </a:r>
-            <a:r>
-              <a:rPr lang="en-US" sz="3200" dirty="0" smtClean="0">
-                <a:solidFill>
-                  <a:schemeClr val="tx1"/>
-                </a:solidFill>
-                <a:latin typeface="Helvetica Neue"/>
-              </a:rPr>
-              <a:t>new questions on the design of transport protocols: </a:t>
+              <a:rPr lang="en-US" sz="3200" dirty="0" smtClean="0">
+                <a:solidFill>
+                  <a:schemeClr val="tx1"/>
+                </a:solidFill>
+                <a:latin typeface="Helvetica Neue"/>
+              </a:rPr>
+              <a:t>This raises new questions on the design of transport protocols: </a:t>
             </a:r>
           </a:p>
           <a:p>
@@ -2499,40 +2502,13 @@
               <a:buChar char="•"/>
             </a:pPr>
             <a:r>
-              <a:rPr lang="en-US" sz="3200" dirty="0">
-                <a:solidFill>
-                  <a:schemeClr val="tx1"/>
-                </a:solidFill>
-                <a:latin typeface="Helvetica Neue"/>
-              </a:rPr>
-              <a:t>H</a:t>
-            </a:r>
-            <a:r>
-              <a:rPr lang="en-US" sz="3200" dirty="0" smtClean="0">
-                <a:solidFill>
-                  <a:schemeClr val="tx1"/>
-                </a:solidFill>
-                <a:latin typeface="Helvetica Neue"/>
-              </a:rPr>
-              <a:t>ow does encryption impact </a:t>
-            </a:r>
-            <a:r>
-              <a:rPr lang="en-US" sz="3200" dirty="0">
-                <a:solidFill>
-                  <a:schemeClr val="tx1"/>
-                </a:solidFill>
-                <a:latin typeface="Helvetica Neue"/>
-              </a:rPr>
-              <a:t>existing deployed </a:t>
-            </a:r>
-            <a:r>
-              <a:rPr lang="en-US" sz="3200" dirty="0" smtClean="0">
-                <a:solidFill>
-                  <a:schemeClr val="tx1"/>
-                </a:solidFill>
-                <a:latin typeface="Helvetica Neue"/>
-              </a:rPr>
-              <a:t>infrastructure?</a:t>
+              <a:rPr lang="en-US" sz="3200" dirty="0" smtClean="0">
+                <a:solidFill>
+                  <a:schemeClr val="tx1"/>
+                </a:solidFill>
+                <a:latin typeface="Helvetica Neue"/>
+              </a:rPr>
+              <a:t>How does encryption impact existing deployed infrastructure?</a:t>
             </a:r>
           </a:p>
           <a:p>
@@ -2544,47 +2520,14 @@
               <a:buChar char="•"/>
             </a:pPr>
             <a:r>
-              <a:rPr lang="en-US" sz="3200" dirty="0">
-                <a:solidFill>
-                  <a:schemeClr val="tx1"/>
-                </a:solidFill>
-                <a:latin typeface="Helvetica Neue"/>
-              </a:rPr>
-              <a:t>W</a:t>
-            </a:r>
-            <a:r>
-              <a:rPr lang="en-US" sz="3200" dirty="0" smtClean="0">
-                <a:solidFill>
-                  <a:schemeClr val="tx1"/>
-                </a:solidFill>
-                <a:latin typeface="Helvetica Neue"/>
-              </a:rPr>
-              <a:t>hat </a:t>
-            </a:r>
-            <a:r>
-              <a:rPr lang="en-US" sz="3200" dirty="0">
-                <a:solidFill>
-                  <a:schemeClr val="tx1"/>
-                </a:solidFill>
-                <a:latin typeface="Helvetica Neue"/>
-              </a:rPr>
-              <a:t>options may exist to design new </a:t>
-            </a:r>
-            <a:r>
-              <a:rPr lang="en-US" sz="3200" dirty="0" smtClean="0">
-                <a:solidFill>
-                  <a:schemeClr val="tx1"/>
-                </a:solidFill>
-                <a:latin typeface="Helvetica Neue"/>
-              </a:rPr>
-              <a:t>protocols with explicit support for certain in-network function? </a:t>
-            </a:r>
-            <a:endParaRPr lang="en-US" sz="3200" dirty="0">
-              <a:solidFill>
-                <a:schemeClr val="tx1"/>
-              </a:solidFill>
-              <a:latin typeface="Helvetica Neue"/>
-            </a:endParaRPr>
+              <a:rPr lang="en-US" sz="3200" dirty="0" smtClean="0">
+                <a:solidFill>
+                  <a:schemeClr val="tx1"/>
+                </a:solidFill>
+                <a:latin typeface="Helvetica Neue"/>
+              </a:rPr>
+              <a:t>What options exist to design new protocols with explicit support for certain in-network function? </a:t>
+            </a:r>
           </a:p>
           <a:p>
             <a:pPr marL="457200" indent="-457200">
@@ -2595,33 +2538,15 @@
               <a:buChar char="•"/>
             </a:pPr>
             <a:r>
-              <a:rPr lang="en-US" sz="3200" dirty="0" smtClean="0">
-                <a:solidFill>
-                  <a:schemeClr val="tx1"/>
-                </a:solidFill>
-                <a:latin typeface="Helvetica Neue"/>
-              </a:rPr>
-              <a:t>What </a:t>
-            </a:r>
-            <a:r>
               <a:rPr lang="en-US" sz="3200" dirty="0">
                 <a:solidFill>
                   <a:schemeClr val="tx1"/>
                 </a:solidFill>
                 <a:latin typeface="Helvetica Neue"/>
               </a:rPr>
-              <a:t>form of operational support would need to be offered when these new protocols are </a:t>
-            </a:r>
-            <a:r>
-              <a:rPr lang="en-US" sz="3200" dirty="0" smtClean="0">
-                <a:solidFill>
-                  <a:schemeClr val="tx1"/>
-                </a:solidFill>
-                <a:latin typeface="Helvetica Neue"/>
-              </a:rPr>
-              <a:t>deployed?</a:t>
-            </a:r>
-            <a:endParaRPr lang="de-DE" sz="3200" dirty="0">
+              <a:t>What operational support is needed to deploy new protocols?</a:t>
+            </a:r>
+            <a:endParaRPr lang="de-DE" sz="3200" dirty="0" smtClean="0">
               <a:solidFill>
                 <a:schemeClr val="tx1"/>
               </a:solidFill>
@@ -3373,9 +3298,6 @@
               </a:rPr>
               <a:t>)</a:t>
             </a:r>
-            <a:endParaRPr lang="en-US" sz="3200" b="1" dirty="0">
-              <a:latin typeface="Helvetica Neue"/>
-            </a:endParaRPr>
           </a:p>
         </p:txBody>
       </p:sp>
@@ -3412,7 +3334,7 @@
             </a:ln>
             <a:extLst>
               <a:ext uri="{C572A759-6A51-4108-AA02-DFA0A04FC94B}">
-                <ma14:wrappingTextBoxFlag xmlns="" xmlns:ma14="http://schemas.microsoft.com/office/mac/drawingml/2011/main" val="1"/>
+                <ma14:wrappingTextBoxFlag xmlns:ma14="http://schemas.microsoft.com/office/mac/drawingml/2011/main" xmlns="" val="1"/>
               </a:ext>
             </a:extLst>
           </p:spPr>
@@ -3466,7 +3388,7 @@
             </a:ln>
             <a:extLst>
               <a:ext uri="{C572A759-6A51-4108-AA02-DFA0A04FC94B}">
-                <ma14:wrappingTextBoxFlag xmlns="" xmlns:ma14="http://schemas.microsoft.com/office/mac/drawingml/2011/main" val="1"/>
+                <ma14:wrappingTextBoxFlag xmlns:ma14="http://schemas.microsoft.com/office/mac/drawingml/2011/main" xmlns="" val="1"/>
               </a:ext>
             </a:extLst>
           </p:spPr>
@@ -3543,270 +3465,255 @@
           </p:spPr>
         </p:pic>
       </p:grpSp>
-      <p:grpSp>
-        <p:nvGrpSpPr>
-          <p:cNvPr id="10" name="Gruppieren 9"/>
-          <p:cNvGrpSpPr/>
+      <p:sp>
+        <p:nvSpPr>
+          <p:cNvPr id="5" name="Gleichschenkliges Dreieck 4"/>
+          <p:cNvSpPr/>
           <p:nvPr/>
-        </p:nvGrpSpPr>
-        <p:grpSpPr>
+        </p:nvSpPr>
+        <p:spPr>
           <a:xfrm>
-            <a:off x="1779270" y="18335682"/>
-            <a:ext cx="12659118" cy="4635384"/>
-            <a:chOff x="1807753" y="18174830"/>
-            <a:chExt cx="12659118" cy="4635384"/>
+            <a:off x="6570809" y="19695999"/>
+            <a:ext cx="2743200" cy="2412061"/>
           </a:xfrm>
-        </p:grpSpPr>
-        <p:sp>
-          <p:nvSpPr>
-            <p:cNvPr id="5" name="Gleichschenkliges Dreieck 4"/>
-            <p:cNvSpPr/>
-            <p:nvPr/>
-          </p:nvSpPr>
-          <p:spPr>
-            <a:xfrm>
-              <a:off x="5995832" y="19212980"/>
-              <a:ext cx="3757616" cy="3026980"/>
-            </a:xfrm>
-            <a:prstGeom prst="triangle">
-              <a:avLst/>
-            </a:prstGeom>
+          <a:prstGeom prst="triangle">
+            <a:avLst/>
+          </a:prstGeom>
+          <a:solidFill>
+            <a:srgbClr val="FFD66A"/>
+          </a:solidFill>
+          <a:ln w="76200">
             <a:solidFill>
-              <a:schemeClr val="bg1"/>
+              <a:schemeClr val="tx1"/>
             </a:solidFill>
-            <a:ln>
-              <a:solidFill>
-                <a:schemeClr val="tx1"/>
-              </a:solidFill>
-            </a:ln>
-          </p:spPr>
-          <p:style>
-            <a:lnRef idx="2">
-              <a:schemeClr val="accent1">
-                <a:shade val="50000"/>
-              </a:schemeClr>
-            </a:lnRef>
-            <a:fillRef idx="1">
-              <a:schemeClr val="accent1"/>
-            </a:fillRef>
-            <a:effectRef idx="0">
-              <a:schemeClr val="accent1"/>
-            </a:effectRef>
-            <a:fontRef idx="minor">
-              <a:schemeClr val="lt1"/>
-            </a:fontRef>
-          </p:style>
-          <p:txBody>
-            <a:bodyPr rtlCol="0" anchor="ctr"/>
-            <a:lstStyle/>
-            <a:p>
-              <a:pPr algn="ctr"/>
-              <a:endParaRPr lang="en-US"/>
-            </a:p>
-          </p:txBody>
-        </p:sp>
-        <p:sp>
-          <p:nvSpPr>
-            <p:cNvPr id="6" name="Textfeld 5"/>
-            <p:cNvSpPr txBox="1"/>
-            <p:nvPr/>
-          </p:nvSpPr>
-          <p:spPr>
-            <a:xfrm>
-              <a:off x="4118645" y="18174830"/>
-              <a:ext cx="7511993" cy="1077218"/>
-            </a:xfrm>
-            <a:prstGeom prst="rect">
-              <a:avLst/>
-            </a:prstGeom>
-            <a:noFill/>
-          </p:spPr>
-          <p:txBody>
-            <a:bodyPr wrap="none" rtlCol="0">
-              <a:spAutoFit/>
-            </a:bodyPr>
-            <a:lstStyle/>
-            <a:p>
-              <a:pPr algn="ctr"/>
-              <a:r>
-                <a:rPr lang="en-US" sz="3200" b="1" dirty="0" smtClean="0">
-                  <a:latin typeface="Helvetica Neue"/>
-                </a:rPr>
-                <a:t>Expanding deployment of encryption </a:t>
-              </a:r>
-            </a:p>
-            <a:p>
-              <a:pPr algn="ctr"/>
-              <a:r>
-                <a:rPr lang="en-US" sz="3200" b="1" dirty="0" smtClean="0">
-                  <a:latin typeface="Helvetica Neue"/>
-                </a:rPr>
-                <a:t>to </a:t>
-              </a:r>
-              <a:r>
-                <a:rPr lang="en-US" sz="3200" b="1" dirty="0">
-                  <a:latin typeface="Helvetica Neue"/>
-                </a:rPr>
-                <a:t>protect end-user privacy</a:t>
-              </a:r>
-            </a:p>
-          </p:txBody>
-        </p:sp>
-        <p:sp>
-          <p:nvSpPr>
-            <p:cNvPr id="7" name="Textfeld 6"/>
-            <p:cNvSpPr txBox="1"/>
-            <p:nvPr/>
-          </p:nvSpPr>
-          <p:spPr>
-            <a:xfrm>
-              <a:off x="1807753" y="20748111"/>
-              <a:ext cx="4621778" cy="2062103"/>
-            </a:xfrm>
-            <a:prstGeom prst="rect">
-              <a:avLst/>
-            </a:prstGeom>
-            <a:noFill/>
-          </p:spPr>
-          <p:txBody>
-            <a:bodyPr wrap="none" rtlCol="0">
-              <a:spAutoFit/>
-            </a:bodyPr>
-            <a:lstStyle/>
-            <a:p>
-              <a:pPr algn="ctr"/>
-              <a:r>
-                <a:rPr lang="en-US" sz="3200" b="1" dirty="0" smtClean="0">
-                  <a:latin typeface="Helvetica Neue"/>
-                </a:rPr>
-                <a:t>Restoration </a:t>
-              </a:r>
-              <a:r>
-                <a:rPr lang="en-US" sz="3200" b="1" dirty="0">
-                  <a:latin typeface="Helvetica Neue"/>
-                </a:rPr>
-                <a:t>of the </a:t>
-              </a:r>
-              <a:endParaRPr lang="en-US" sz="3200" b="1" dirty="0" smtClean="0">
-                <a:latin typeface="Helvetica Neue"/>
-              </a:endParaRPr>
-            </a:p>
-            <a:p>
-              <a:pPr algn="ctr"/>
-              <a:r>
-                <a:rPr lang="en-US" sz="3200" b="1" dirty="0" smtClean="0">
-                  <a:latin typeface="Helvetica Neue"/>
-                </a:rPr>
-                <a:t>end-to-end </a:t>
-              </a:r>
-              <a:r>
-                <a:rPr lang="en-US" sz="3200" b="1" dirty="0">
-                  <a:latin typeface="Helvetica Neue"/>
-                </a:rPr>
-                <a:t>principle </a:t>
-              </a:r>
-              <a:endParaRPr lang="en-US" sz="3200" b="1" dirty="0" smtClean="0">
-                <a:latin typeface="Helvetica Neue"/>
-              </a:endParaRPr>
-            </a:p>
-            <a:p>
-              <a:pPr algn="ctr"/>
-              <a:r>
-                <a:rPr lang="en-US" sz="3200" b="1" dirty="0" smtClean="0">
-                  <a:latin typeface="Helvetica Neue"/>
-                </a:rPr>
-                <a:t>in </a:t>
-              </a:r>
-              <a:r>
-                <a:rPr lang="en-US" sz="3200" b="1" dirty="0">
-                  <a:latin typeface="Helvetica Neue"/>
-                </a:rPr>
-                <a:t>the face of </a:t>
-              </a:r>
-              <a:endParaRPr lang="en-US" sz="3200" b="1" dirty="0" smtClean="0">
-                <a:latin typeface="Helvetica Neue"/>
-              </a:endParaRPr>
-            </a:p>
-            <a:p>
-              <a:pPr algn="ctr"/>
-              <a:r>
-                <a:rPr lang="en-US" sz="3200" b="1" dirty="0" smtClean="0">
-                  <a:latin typeface="Helvetica Neue"/>
-                </a:rPr>
-                <a:t>increasing </a:t>
-              </a:r>
-              <a:r>
-                <a:rPr lang="en-US" sz="3200" b="1" dirty="0">
-                  <a:latin typeface="Helvetica Neue"/>
-                </a:rPr>
-                <a:t>ossification</a:t>
-              </a:r>
-            </a:p>
-          </p:txBody>
-        </p:sp>
-        <p:sp>
-          <p:nvSpPr>
-            <p:cNvPr id="8" name="Textfeld 7"/>
-            <p:cNvSpPr txBox="1"/>
-            <p:nvPr/>
-          </p:nvSpPr>
-          <p:spPr>
-            <a:xfrm>
-              <a:off x="9550140" y="20748110"/>
-              <a:ext cx="4916731" cy="2062103"/>
-            </a:xfrm>
-            <a:prstGeom prst="rect">
-              <a:avLst/>
-            </a:prstGeom>
-            <a:noFill/>
-          </p:spPr>
-          <p:txBody>
-            <a:bodyPr wrap="none" rtlCol="0">
-              <a:spAutoFit/>
-            </a:bodyPr>
-            <a:lstStyle/>
-            <a:p>
-              <a:pPr algn="ctr"/>
-              <a:r>
-                <a:rPr lang="en-US" sz="3200" b="1" dirty="0" smtClean="0">
-                  <a:latin typeface="Helvetica Neue"/>
-                </a:rPr>
-                <a:t>Dependency on</a:t>
-              </a:r>
-            </a:p>
-            <a:p>
-              <a:pPr algn="ctr"/>
-              <a:r>
-                <a:rPr lang="en-US" sz="3200" b="1" dirty="0" smtClean="0">
-                  <a:latin typeface="Helvetica Neue"/>
-                </a:rPr>
-                <a:t>in-network functionality </a:t>
-              </a:r>
-            </a:p>
-            <a:p>
-              <a:pPr algn="ctr"/>
-              <a:r>
-                <a:rPr lang="en-US" sz="3200" b="1" dirty="0" smtClean="0">
-                  <a:latin typeface="Helvetica Neue"/>
-                </a:rPr>
-                <a:t>to support </a:t>
-              </a:r>
-            </a:p>
-            <a:p>
-              <a:pPr algn="ctr"/>
-              <a:r>
-                <a:rPr lang="en-US" sz="3200" b="1" dirty="0" smtClean="0">
-                  <a:latin typeface="Helvetica Neue"/>
-                </a:rPr>
-                <a:t>network operations</a:t>
-              </a:r>
-              <a:endParaRPr lang="en-US" sz="3200" b="1" dirty="0">
-                <a:latin typeface="Helvetica Neue"/>
-              </a:endParaRPr>
-            </a:p>
-          </p:txBody>
-        </p:sp>
-      </p:grpSp>
+          </a:ln>
+        </p:spPr>
+        <p:style>
+          <a:lnRef idx="2">
+            <a:schemeClr val="accent1">
+              <a:shade val="50000"/>
+            </a:schemeClr>
+          </a:lnRef>
+          <a:fillRef idx="1">
+            <a:schemeClr val="accent1"/>
+          </a:fillRef>
+          <a:effectRef idx="0">
+            <a:schemeClr val="accent1"/>
+          </a:effectRef>
+          <a:fontRef idx="minor">
+            <a:schemeClr val="lt1"/>
+          </a:fontRef>
+        </p:style>
+        <p:txBody>
+          <a:bodyPr rtlCol="0" anchor="ctr"/>
+          <a:lstStyle/>
+          <a:p>
+            <a:pPr algn="ctr"/>
+            <a:endParaRPr lang="en-US"/>
+          </a:p>
+        </p:txBody>
+      </p:sp>
+      <p:sp>
+        <p:nvSpPr>
+          <p:cNvPr id="6" name="Textfeld 5"/>
+          <p:cNvSpPr txBox="1"/>
+          <p:nvPr/>
+        </p:nvSpPr>
+        <p:spPr>
+          <a:xfrm>
+            <a:off x="4090162" y="18335682"/>
+            <a:ext cx="7511993" cy="1077218"/>
+          </a:xfrm>
+          <a:prstGeom prst="rect">
+            <a:avLst/>
+          </a:prstGeom>
+          <a:noFill/>
+        </p:spPr>
+        <p:txBody>
+          <a:bodyPr wrap="none" rtlCol="0">
+            <a:spAutoFit/>
+          </a:bodyPr>
+          <a:lstStyle/>
+          <a:p>
+            <a:pPr algn="ctr"/>
+            <a:r>
+              <a:rPr lang="en-US" sz="3200" b="1" dirty="0" smtClean="0">
+                <a:latin typeface="Helvetica Neue"/>
+              </a:rPr>
+              <a:t>Expanding deployment of encryption </a:t>
+            </a:r>
+          </a:p>
+          <a:p>
+            <a:pPr algn="ctr"/>
+            <a:r>
+              <a:rPr lang="en-US" sz="3200" b="1" dirty="0" smtClean="0">
+                <a:latin typeface="Helvetica Neue"/>
+              </a:rPr>
+              <a:t>to </a:t>
+            </a:r>
+            <a:r>
+              <a:rPr lang="en-US" sz="3200" b="1" dirty="0">
+                <a:latin typeface="Helvetica Neue"/>
+              </a:rPr>
+              <a:t>protect end-user privacy</a:t>
+            </a:r>
+          </a:p>
+        </p:txBody>
+      </p:sp>
+      <p:sp>
+        <p:nvSpPr>
+          <p:cNvPr id="7" name="Textfeld 6"/>
+          <p:cNvSpPr txBox="1"/>
+          <p:nvPr/>
+        </p:nvSpPr>
+        <p:spPr>
+          <a:xfrm>
+            <a:off x="1779270" y="20908963"/>
+            <a:ext cx="4621778" cy="2062103"/>
+          </a:xfrm>
+          <a:prstGeom prst="rect">
+            <a:avLst/>
+          </a:prstGeom>
+          <a:noFill/>
+        </p:spPr>
+        <p:txBody>
+          <a:bodyPr wrap="none" rtlCol="0">
+            <a:spAutoFit/>
+          </a:bodyPr>
+          <a:lstStyle/>
+          <a:p>
+            <a:pPr algn="ctr"/>
+            <a:r>
+              <a:rPr lang="en-US" sz="3200" b="1" dirty="0" smtClean="0">
+                <a:latin typeface="Helvetica Neue"/>
+              </a:rPr>
+              <a:t>Restoration </a:t>
+            </a:r>
+            <a:r>
+              <a:rPr lang="en-US" sz="3200" b="1" dirty="0">
+                <a:latin typeface="Helvetica Neue"/>
+              </a:rPr>
+              <a:t>of the </a:t>
+            </a:r>
+            <a:endParaRPr lang="en-US" sz="3200" b="1" dirty="0" smtClean="0">
+              <a:latin typeface="Helvetica Neue"/>
+            </a:endParaRPr>
+          </a:p>
+          <a:p>
+            <a:pPr algn="ctr"/>
+            <a:r>
+              <a:rPr lang="en-US" sz="3200" b="1" dirty="0" smtClean="0">
+                <a:latin typeface="Helvetica Neue"/>
+              </a:rPr>
+              <a:t>end-to-end </a:t>
+            </a:r>
+            <a:r>
+              <a:rPr lang="en-US" sz="3200" b="1" dirty="0">
+                <a:latin typeface="Helvetica Neue"/>
+              </a:rPr>
+              <a:t>principle </a:t>
+            </a:r>
+            <a:endParaRPr lang="en-US" sz="3200" b="1" dirty="0" smtClean="0">
+              <a:latin typeface="Helvetica Neue"/>
+            </a:endParaRPr>
+          </a:p>
+          <a:p>
+            <a:pPr algn="ctr"/>
+            <a:r>
+              <a:rPr lang="en-US" sz="3200" b="1" dirty="0" smtClean="0">
+                <a:latin typeface="Helvetica Neue"/>
+              </a:rPr>
+              <a:t>in </a:t>
+            </a:r>
+            <a:r>
+              <a:rPr lang="en-US" sz="3200" b="1" dirty="0">
+                <a:latin typeface="Helvetica Neue"/>
+              </a:rPr>
+              <a:t>the face of </a:t>
+            </a:r>
+            <a:endParaRPr lang="en-US" sz="3200" b="1" dirty="0" smtClean="0">
+              <a:latin typeface="Helvetica Neue"/>
+            </a:endParaRPr>
+          </a:p>
+          <a:p>
+            <a:pPr algn="ctr"/>
+            <a:r>
+              <a:rPr lang="en-US" sz="3200" b="1" dirty="0" smtClean="0">
+                <a:latin typeface="Helvetica Neue"/>
+              </a:rPr>
+              <a:t>increasing </a:t>
+            </a:r>
+            <a:r>
+              <a:rPr lang="en-US" sz="3200" b="1" dirty="0">
+                <a:latin typeface="Helvetica Neue"/>
+              </a:rPr>
+              <a:t>ossification</a:t>
+            </a:r>
+          </a:p>
+        </p:txBody>
+      </p:sp>
+      <p:sp>
+        <p:nvSpPr>
+          <p:cNvPr id="8" name="Textfeld 7"/>
+          <p:cNvSpPr txBox="1"/>
+          <p:nvPr/>
+        </p:nvSpPr>
+        <p:spPr>
+          <a:xfrm>
+            <a:off x="9521657" y="20908962"/>
+            <a:ext cx="4916731" cy="2062103"/>
+          </a:xfrm>
+          <a:prstGeom prst="rect">
+            <a:avLst/>
+          </a:prstGeom>
+          <a:noFill/>
+        </p:spPr>
+        <p:txBody>
+          <a:bodyPr wrap="none" rtlCol="0">
+            <a:spAutoFit/>
+          </a:bodyPr>
+          <a:lstStyle/>
+          <a:p>
+            <a:pPr algn="ctr"/>
+            <a:r>
+              <a:rPr lang="en-US" sz="3200" b="1" dirty="0" smtClean="0">
+                <a:latin typeface="Helvetica Neue"/>
+              </a:rPr>
+              <a:t>Dependency on</a:t>
+            </a:r>
+          </a:p>
+          <a:p>
+            <a:pPr algn="ctr"/>
+            <a:r>
+              <a:rPr lang="en-US" sz="3200" b="1" dirty="0" smtClean="0">
+                <a:latin typeface="Helvetica Neue"/>
+              </a:rPr>
+              <a:t>in-network functionality </a:t>
+            </a:r>
+          </a:p>
+          <a:p>
+            <a:pPr algn="ctr"/>
+            <a:r>
+              <a:rPr lang="en-US" sz="3200" b="1" dirty="0" smtClean="0">
+                <a:latin typeface="Helvetica Neue"/>
+              </a:rPr>
+              <a:t>to support </a:t>
+            </a:r>
+          </a:p>
+          <a:p>
+            <a:pPr algn="ctr"/>
+            <a:r>
+              <a:rPr lang="en-US" sz="3200" b="1" dirty="0" smtClean="0">
+                <a:latin typeface="Helvetica Neue"/>
+              </a:rPr>
+              <a:t>network operations</a:t>
+            </a:r>
+            <a:endParaRPr lang="en-US" sz="3200" b="1" dirty="0">
+              <a:latin typeface="Helvetica Neue"/>
+            </a:endParaRPr>
+          </a:p>
+        </p:txBody>
+      </p:sp>
       <p:pic>
         <p:nvPicPr>
           <p:cNvPr id="11" name="Grafik 10"/>
@@ -4336,7 +4243,13 @@
               <a:rPr lang="en-US" sz="3200" dirty="0" smtClean="0">
                 <a:latin typeface="Helvetica Neue"/>
               </a:rPr>
-              <a:t>Trust by verify under the assumption that two endpoints have a trust relation for integrity protection and encryption but there is no requirement for an explicit trust relationship with the network</a:t>
+              <a:t>Trust by verify under the assumption that two endpoints have a trust relation for integrity protection and </a:t>
+            </a:r>
+            <a:r>
+              <a:rPr lang="en-US" sz="3200" dirty="0">
+                <a:latin typeface="Helvetica Neue"/>
+              </a:rPr>
+              <a:t>encryption, but generally no requirement for explicit trust relationship with network devices.</a:t>
             </a:r>
             <a:endParaRPr lang="en-US" sz="3200" dirty="0">
               <a:latin typeface="Helvetica Neue"/>

</xml_diff>